<commit_message>
Hao's feedback is adapted :)
</commit_message>
<xml_diff>
--- a/pptx/idash_track3_HE.pptx
+++ b/pptx/idash_track3_HE.pptx
@@ -257,7 +257,7 @@
             <a:fld id="{0158C5BC-9A70-462C-B28D-9600239EAC64}" type="datetimeFigureOut">
               <a:rPr lang="en-US" smtClean="0"/>
               <a:pPr/>
-              <a:t>10/4/17</a:t>
+              <a:t>10/5/17</a:t>
             </a:fld>
             <a:endParaRPr lang="en-US"/>
           </a:p>
@@ -424,7 +424,7 @@
             <a:fld id="{E6CC2317-6751-4CD4-9995-8782DD78E936}" type="datetimeFigureOut">
               <a:rPr lang="en-US" smtClean="0"/>
               <a:pPr/>
-              <a:t>10/4/17</a:t>
+              <a:t>10/5/17</a:t>
             </a:fld>
             <a:endParaRPr lang="en-US" dirty="0"/>
           </a:p>
@@ -5469,7 +5469,7 @@
               <a:graphicData uri="http://schemas.openxmlformats.org/presentationml/2006/ole">
                 <mc:AlternateContent xmlns:mc="http://schemas.openxmlformats.org/markup-compatibility/2006">
                   <mc:Choice xmlns:v="urn:schemas-microsoft-com:vml" Requires="v">
-                    <p:oleObj spid="_x0000_s1280" name="Image" r:id="rId8" imgW="1828440" imgH="1117440" progId="Photoshop.Image.13">
+                    <p:oleObj spid="_x0000_s1293" name="Image" r:id="rId8" imgW="1828440" imgH="1117440" progId="Photoshop.Image.13">
                       <p:embed/>
                     </p:oleObj>
                   </mc:Choice>
@@ -5526,7 +5526,7 @@
               <a:graphicData uri="http://schemas.openxmlformats.org/presentationml/2006/ole">
                 <mc:AlternateContent xmlns:mc="http://schemas.openxmlformats.org/markup-compatibility/2006">
                   <mc:Choice xmlns:v="urn:schemas-microsoft-com:vml" Requires="v">
-                    <p:oleObj spid="_x0000_s1281" name="Image" r:id="rId10" imgW="1828440" imgH="1117440" progId="Photoshop.Image.13">
+                    <p:oleObj spid="_x0000_s1294" name="Image" r:id="rId10" imgW="1828440" imgH="1117440" progId="Photoshop.Image.13">
                       <p:embed/>
                     </p:oleObj>
                   </mc:Choice>
@@ -6654,7 +6654,7 @@
             <a:graphicData uri="http://schemas.openxmlformats.org/presentationml/2006/ole">
               <mc:AlternateContent xmlns:mc="http://schemas.openxmlformats.org/markup-compatibility/2006">
                 <mc:Choice xmlns:v="urn:schemas-microsoft-com:vml" Requires="v">
-                  <p:oleObj spid="_x0000_s1282" name="Image" r:id="rId12" imgW="4571280" imgH="1688760" progId="Photoshop.Image.13">
+                  <p:oleObj spid="_x0000_s1295" name="Image" r:id="rId12" imgW="4571280" imgH="1688760" progId="Photoshop.Image.13">
                     <p:embed/>
                   </p:oleObj>
                 </mc:Choice>
@@ -6738,7 +6738,7 @@
             <a:graphicData uri="http://schemas.openxmlformats.org/presentationml/2006/ole">
               <mc:AlternateContent xmlns:mc="http://schemas.openxmlformats.org/markup-compatibility/2006">
                 <mc:Choice xmlns:v="urn:schemas-microsoft-com:vml" Requires="v">
-                  <p:oleObj spid="_x0000_s1283" name="Image" r:id="rId15" imgW="1574280" imgH="1053720" progId="Photoshop.Image.13">
+                  <p:oleObj spid="_x0000_s1296" name="Image" r:id="rId15" imgW="1574280" imgH="1053720" progId="Photoshop.Image.13">
                     <p:embed/>
                   </p:oleObj>
                 </mc:Choice>
@@ -8695,7 +8695,7 @@
             <a:graphicData uri="http://schemas.openxmlformats.org/presentationml/2006/ole">
               <mc:AlternateContent xmlns:mc="http://schemas.openxmlformats.org/markup-compatibility/2006">
                 <mc:Choice xmlns:v="urn:schemas-microsoft-com:vml" Requires="v">
-                  <p:oleObj spid="_x0000_s2304" name="Image" r:id="rId4" imgW="4571280" imgH="1688760" progId="Photoshop.Image.13">
+                  <p:oleObj spid="_x0000_s2317" name="Image" r:id="rId4" imgW="4571280" imgH="1688760" progId="Photoshop.Image.13">
                     <p:embed/>
                   </p:oleObj>
                 </mc:Choice>
@@ -8779,7 +8779,7 @@
             <a:graphicData uri="http://schemas.openxmlformats.org/presentationml/2006/ole">
               <mc:AlternateContent xmlns:mc="http://schemas.openxmlformats.org/markup-compatibility/2006">
                 <mc:Choice xmlns:v="urn:schemas-microsoft-com:vml" Requires="v">
-                  <p:oleObj spid="_x0000_s2305" name="Image" r:id="rId7" imgW="1574280" imgH="1053720" progId="Photoshop.Image.13">
+                  <p:oleObj spid="_x0000_s2318" name="Image" r:id="rId7" imgW="1574280" imgH="1053720" progId="Photoshop.Image.13">
                     <p:embed/>
                   </p:oleObj>
                 </mc:Choice>
@@ -10175,7 +10175,7 @@
               <a:graphicData uri="http://schemas.openxmlformats.org/presentationml/2006/ole">
                 <mc:AlternateContent xmlns:mc="http://schemas.openxmlformats.org/markup-compatibility/2006">
                   <mc:Choice xmlns:v="urn:schemas-microsoft-com:vml" Requires="v">
-                    <p:oleObj spid="_x0000_s2306" name="Image" r:id="rId15" imgW="1828440" imgH="1117440" progId="Photoshop.Image.13">
+                    <p:oleObj spid="_x0000_s2319" name="Image" r:id="rId15" imgW="1828440" imgH="1117440" progId="Photoshop.Image.13">
                       <p:embed/>
                     </p:oleObj>
                   </mc:Choice>
@@ -10232,7 +10232,7 @@
               <a:graphicData uri="http://schemas.openxmlformats.org/presentationml/2006/ole">
                 <mc:AlternateContent xmlns:mc="http://schemas.openxmlformats.org/markup-compatibility/2006">
                   <mc:Choice xmlns:v="urn:schemas-microsoft-com:vml" Requires="v">
-                    <p:oleObj spid="_x0000_s2307" name="Image" r:id="rId17" imgW="1828440" imgH="1117440" progId="Photoshop.Image.13">
+                    <p:oleObj spid="_x0000_s2320" name="Image" r:id="rId17" imgW="1828440" imgH="1117440" progId="Photoshop.Image.13">
                       <p:embed/>
                     </p:oleObj>
                   </mc:Choice>
@@ -12144,7 +12144,7 @@
             <a:graphicData uri="http://schemas.openxmlformats.org/presentationml/2006/ole">
               <mc:AlternateContent xmlns:mc="http://schemas.openxmlformats.org/markup-compatibility/2006">
                 <mc:Choice xmlns:v="urn:schemas-microsoft-com:vml" Requires="v">
-                  <p:oleObj spid="_x0000_s3328" name="Image" r:id="rId4" imgW="4571280" imgH="1688760" progId="Photoshop.Image.13">
+                  <p:oleObj spid="_x0000_s3341" name="Image" r:id="rId4" imgW="4571280" imgH="1688760" progId="Photoshop.Image.13">
                     <p:embed/>
                   </p:oleObj>
                 </mc:Choice>
@@ -12228,7 +12228,7 @@
             <a:graphicData uri="http://schemas.openxmlformats.org/presentationml/2006/ole">
               <mc:AlternateContent xmlns:mc="http://schemas.openxmlformats.org/markup-compatibility/2006">
                 <mc:Choice xmlns:v="urn:schemas-microsoft-com:vml" Requires="v">
-                  <p:oleObj spid="_x0000_s3329" name="Image" r:id="rId7" imgW="1574280" imgH="1053720" progId="Photoshop.Image.13">
+                  <p:oleObj spid="_x0000_s3342" name="Image" r:id="rId7" imgW="1574280" imgH="1053720" progId="Photoshop.Image.13">
                     <p:embed/>
                   </p:oleObj>
                 </mc:Choice>
@@ -13624,7 +13624,7 @@
               <a:graphicData uri="http://schemas.openxmlformats.org/presentationml/2006/ole">
                 <mc:AlternateContent xmlns:mc="http://schemas.openxmlformats.org/markup-compatibility/2006">
                   <mc:Choice xmlns:v="urn:schemas-microsoft-com:vml" Requires="v">
-                    <p:oleObj spid="_x0000_s3330" name="Image" r:id="rId15" imgW="1828440" imgH="1117440" progId="Photoshop.Image.13">
+                    <p:oleObj spid="_x0000_s3343" name="Image" r:id="rId15" imgW="1828440" imgH="1117440" progId="Photoshop.Image.13">
                       <p:embed/>
                     </p:oleObj>
                   </mc:Choice>
@@ -13681,7 +13681,7 @@
               <a:graphicData uri="http://schemas.openxmlformats.org/presentationml/2006/ole">
                 <mc:AlternateContent xmlns:mc="http://schemas.openxmlformats.org/markup-compatibility/2006">
                   <mc:Choice xmlns:v="urn:schemas-microsoft-com:vml" Requires="v">
-                    <p:oleObj spid="_x0000_s3331" name="Image" r:id="rId17" imgW="1828440" imgH="1117440" progId="Photoshop.Image.13">
+                    <p:oleObj spid="_x0000_s3344" name="Image" r:id="rId17" imgW="1828440" imgH="1117440" progId="Photoshop.Image.13">
                       <p:embed/>
                     </p:oleObj>
                   </mc:Choice>
@@ -14536,7 +14536,23 @@
                   <a:srgbClr val="002060"/>
                 </a:solidFill>
               </a:rPr>
-              <a:t>To run learning phase of machine learning in encrypted state, what is the problem? </a:t>
+              <a:t>To run learning phase of machine learning in encrypted state, what is </a:t>
+            </a:r>
+            <a:r>
+              <a:rPr lang="en-US" sz="4000" dirty="0" smtClean="0">
+                <a:solidFill>
+                  <a:srgbClr val="002060"/>
+                </a:solidFill>
+              </a:rPr>
+              <a:t>the big </a:t>
+            </a:r>
+            <a:r>
+              <a:rPr lang="en-US" sz="4000" dirty="0" smtClean="0">
+                <a:solidFill>
+                  <a:srgbClr val="002060"/>
+                </a:solidFill>
+              </a:rPr>
+              <a:t>problem? </a:t>
             </a:r>
             <a:r>
               <a:rPr lang="en-US" sz="4000" b="1" dirty="0">
@@ -14767,11 +14783,6 @@
               </a:rPr>
               <a:t>Degree 1 and 3 for each</a:t>
             </a:r>
-            <a:endParaRPr lang="en-US" sz="4000" dirty="0" smtClean="0">
-              <a:solidFill>
-                <a:srgbClr val="002060"/>
-              </a:solidFill>
-            </a:endParaRPr>
           </a:p>
         </p:txBody>
       </p:sp>
@@ -15077,15 +15088,7 @@
                   <a:srgbClr val="002060"/>
                 </a:solidFill>
               </a:rPr>
-              <a:t>Kristin </a:t>
-            </a:r>
-            <a:r>
-              <a:rPr lang="en-US" dirty="0" smtClean="0">
-                <a:solidFill>
-                  <a:srgbClr val="002060"/>
-                </a:solidFill>
-              </a:rPr>
-              <a:t>Lauter</a:t>
+              <a:t>Kristin Lauter</a:t>
             </a:r>
             <a:r>
               <a:rPr lang="en-US" baseline="30000" dirty="0" smtClean="0">
@@ -15157,7 +15160,7 @@
         <p:spPr>
           <a:xfrm>
             <a:off x="1828723" y="30740869"/>
-            <a:ext cx="27909514" cy="1569638"/>
+            <a:ext cx="41313704" cy="1680438"/>
           </a:xfrm>
         </p:spPr>
         <p:txBody>
@@ -15199,6 +15202,36 @@
             <a:r>
               <a:rPr lang="en-US" sz="3600" dirty="0" smtClean="0"/>
               <a:t>.</a:t>
+            </a:r>
+          </a:p>
+          <a:p>
+            <a:r>
+              <a:rPr lang="en-US" sz="3600" dirty="0" smtClean="0"/>
+              <a:t>[2] </a:t>
+            </a:r>
+            <a:r>
+              <a:rPr lang="en-US" sz="3600" dirty="0" err="1" smtClean="0"/>
+              <a:t>Bajard</a:t>
+            </a:r>
+            <a:r>
+              <a:rPr lang="en-US" sz="3600" dirty="0"/>
+              <a:t>, Jean-Claude, et al. "A full RNS variant of FV like somewhat </a:t>
+            </a:r>
+            <a:r>
+              <a:rPr lang="en-US" sz="3600" dirty="0" err="1"/>
+              <a:t>homomorphic</a:t>
+            </a:r>
+            <a:r>
+              <a:rPr lang="en-US" sz="3600" dirty="0"/>
+              <a:t> encryption schemes." </a:t>
+            </a:r>
+            <a:r>
+              <a:rPr lang="en-US" sz="3600" i="1" dirty="0"/>
+              <a:t>Selected Areas in Cryptography-SAC</a:t>
+            </a:r>
+            <a:r>
+              <a:rPr lang="en-US" sz="3600" dirty="0"/>
+              <a:t>. 2016.</a:t>
             </a:r>
             <a:endParaRPr lang="en-US" sz="3600" dirty="0" smtClean="0">
               <a:solidFill>
@@ -16184,14 +16217,7 @@
                   <a:latin typeface="Times New Roman" panose="02020603050405020304" pitchFamily="18" charset="0"/>
                   <a:cs typeface="Times New Roman" panose="02020603050405020304" pitchFamily="18" charset="0"/>
                 </a:rPr>
-                <a:t>Approx-</a:t>
-              </a:r>
-              <a:r>
-                <a:rPr lang="en-US" sz="3200" dirty="0" err="1" smtClean="0">
-                  <a:latin typeface="Times New Roman" panose="02020603050405020304" pitchFamily="18" charset="0"/>
-                  <a:cs typeface="Times New Roman" panose="02020603050405020304" pitchFamily="18" charset="0"/>
-                </a:rPr>
-                <a:t>Recrypt</a:t>
+                <a:t>Approx-Recrypt</a:t>
               </a:r>
               <a:r>
                 <a:rPr lang="en-US" sz="3200" dirty="0" smtClean="0">
@@ -16554,7 +16580,6 @@
                   <a:rPr lang="en-US" sz="3600" dirty="0"/>
                   <a:t>f</a:t>
                 </a:r>
-                <a:endParaRPr lang="en-US" sz="3600" dirty="0"/>
               </a:p>
             </p:txBody>
           </p:sp>
@@ -16815,8 +16840,8 @@
         </p:nvSpPr>
         <p:spPr>
           <a:xfrm>
-            <a:off x="17539526" y="19182211"/>
-            <a:ext cx="23219882" cy="2554545"/>
+            <a:off x="17539525" y="19182211"/>
+            <a:ext cx="23693837" cy="1938992"/>
           </a:xfrm>
           <a:prstGeom prst="rect">
             <a:avLst/>
@@ -16879,7 +16904,35 @@
                 <a:latin typeface="Times New Roman" panose="02020603050405020304" pitchFamily="18" charset="0"/>
                 <a:cs typeface="Times New Roman" panose="02020603050405020304" pitchFamily="18" charset="0"/>
               </a:rPr>
-              <a:t>Full process is little-bit expensive than bootstrapping, but we can perfume bootstrapping and flooring at once.</a:t>
+              <a:t>Full process is little-bit expensive than bootstrapping, but we can perfume </a:t>
+            </a:r>
+            <a:r>
+              <a:rPr lang="en-US" sz="4000" b="1" u="sng" dirty="0" smtClean="0">
+                <a:latin typeface="Times New Roman" panose="02020603050405020304" pitchFamily="18" charset="0"/>
+                <a:cs typeface="Times New Roman" panose="02020603050405020304" pitchFamily="18" charset="0"/>
+              </a:rPr>
+              <a:t>bootstrapping</a:t>
+            </a:r>
+            <a:r>
+              <a:rPr lang="en-US" sz="4000" dirty="0" smtClean="0">
+                <a:latin typeface="Times New Roman" panose="02020603050405020304" pitchFamily="18" charset="0"/>
+                <a:cs typeface="Times New Roman" panose="02020603050405020304" pitchFamily="18" charset="0"/>
+              </a:rPr>
+              <a:t> and </a:t>
+            </a:r>
+            <a:r>
+              <a:rPr lang="en-US" sz="4000" b="1" u="sng" dirty="0" smtClean="0">
+                <a:latin typeface="Times New Roman" panose="02020603050405020304" pitchFamily="18" charset="0"/>
+                <a:cs typeface="Times New Roman" panose="02020603050405020304" pitchFamily="18" charset="0"/>
+              </a:rPr>
+              <a:t>flooring</a:t>
+            </a:r>
+            <a:r>
+              <a:rPr lang="en-US" sz="4000" dirty="0" smtClean="0">
+                <a:latin typeface="Times New Roman" panose="02020603050405020304" pitchFamily="18" charset="0"/>
+                <a:cs typeface="Times New Roman" panose="02020603050405020304" pitchFamily="18" charset="0"/>
+              </a:rPr>
+              <a:t> at once.</a:t>
             </a:r>
           </a:p>
           <a:p>
@@ -16892,24 +16945,21 @@
                 <a:latin typeface="Times New Roman" panose="02020603050405020304" pitchFamily="18" charset="0"/>
                 <a:cs typeface="Times New Roman" panose="02020603050405020304" pitchFamily="18" charset="0"/>
               </a:rPr>
-              <a:t>Sign Extraction can be expressed by floor function. </a:t>
-            </a:r>
-            <a:endParaRPr lang="ko-KR" altLang="en-US" sz="4000" dirty="0" smtClean="0">
-              <a:latin typeface="Times New Roman" panose="02020603050405020304" pitchFamily="18" charset="0"/>
-              <a:cs typeface="Times New Roman" panose="02020603050405020304" pitchFamily="18" charset="0"/>
-            </a:endParaRPr>
-          </a:p>
-          <a:p>
-            <a:pPr marL="571500" indent="-571500">
-              <a:buFontTx/>
-              <a:buChar char="-"/>
-            </a:pPr>
+              <a:t>Sign Extraction can be expressed by floor </a:t>
+            </a:r>
             <a:r>
               <a:rPr lang="en-US" sz="4000" dirty="0" smtClean="0">
                 <a:latin typeface="Times New Roman" panose="02020603050405020304" pitchFamily="18" charset="0"/>
                 <a:cs typeface="Times New Roman" panose="02020603050405020304" pitchFamily="18" charset="0"/>
               </a:rPr>
-              <a:t>Furthermore, we can adapt SIMD technique.</a:t>
+              <a:t>function, and </a:t>
+            </a:r>
+            <a:r>
+              <a:rPr lang="en-US" sz="4000" dirty="0" smtClean="0">
+                <a:latin typeface="Times New Roman" panose="02020603050405020304" pitchFamily="18" charset="0"/>
+                <a:cs typeface="Times New Roman" panose="02020603050405020304" pitchFamily="18" charset="0"/>
+              </a:rPr>
+              <a:t>we can adapt SIMD technique.</a:t>
             </a:r>
             <a:endParaRPr lang="en-US" sz="4000" dirty="0">
               <a:latin typeface="Times New Roman" panose="02020603050405020304" pitchFamily="18" charset="0"/>
@@ -16956,7 +17006,7 @@
         </p:nvCxnSpPr>
         <p:spPr>
           <a:xfrm flipH="1">
-            <a:off x="15060137" y="22279062"/>
+            <a:off x="15060137" y="23715979"/>
             <a:ext cx="28352091" cy="45868"/>
           </a:xfrm>
           <a:prstGeom prst="line">
@@ -16998,7 +17048,7 @@
         </p:nvSpPr>
         <p:spPr>
           <a:xfrm>
-            <a:off x="29228123" y="22867236"/>
+            <a:off x="28519472" y="23998736"/>
             <a:ext cx="13412936" cy="923322"/>
           </a:xfrm>
         </p:spPr>
@@ -17034,85 +17084,97 @@
         </p:nvSpPr>
         <p:spPr>
           <a:xfrm>
-            <a:off x="29228123" y="24188320"/>
-            <a:ext cx="13914304" cy="3293187"/>
+            <a:off x="28209615" y="24937602"/>
+            <a:ext cx="13914304" cy="5878510"/>
           </a:xfrm>
         </p:spPr>
         <p:txBody>
           <a:bodyPr/>
           <a:lstStyle/>
           <a:p>
-            <a:pPr marL="342900" indent="-342900">
+            <a:pPr marL="571500" indent="-571500">
               <a:buFont typeface="Arial" charset="0"/>
               <a:buChar char="•"/>
             </a:pPr>
             <a:r>
-              <a:rPr lang="en-US" sz="4000" b="1" dirty="0" smtClean="0">
+              <a:rPr lang="en-US" sz="4000" dirty="0" smtClean="0">
+                <a:solidFill>
+                  <a:srgbClr val="002060"/>
+                </a:solidFill>
+              </a:rPr>
+              <a:t>Timing for each iteration is same and bootstrapping is included in </a:t>
+            </a:r>
+            <a:r>
+              <a:rPr lang="en-US" sz="4000" dirty="0" err="1" smtClean="0">
+                <a:solidFill>
+                  <a:srgbClr val="002060"/>
+                </a:solidFill>
+              </a:rPr>
+              <a:t>homomorphic</a:t>
+            </a:r>
+            <a:r>
+              <a:rPr lang="en-US" sz="4000" dirty="0" smtClean="0">
+                <a:solidFill>
+                  <a:srgbClr val="002060"/>
+                </a:solidFill>
+              </a:rPr>
+              <a:t> floor, so we can perform any number of iteration (total running time will increase linear to iteration number).</a:t>
+            </a:r>
+          </a:p>
+          <a:p>
+            <a:pPr marL="571500" indent="-571500">
+              <a:buFont typeface="Arial" charset="0"/>
+              <a:buChar char="•"/>
+            </a:pPr>
+            <a:r>
+              <a:rPr lang="en-US" sz="4000" dirty="0">
                 <a:solidFill>
                   <a:srgbClr val="002060"/>
                 </a:solidFill>
               </a:rPr>
               <a:t>Number of samples: 1000 ~ 2000</a:t>
             </a:r>
-            <a:endParaRPr lang="ko-KR" altLang="en-US" sz="4000" b="1" dirty="0" smtClean="0">
+            <a:endParaRPr lang="ko-KR" altLang="en-US" sz="4000" dirty="0">
               <a:solidFill>
                 <a:srgbClr val="002060"/>
               </a:solidFill>
             </a:endParaRPr>
           </a:p>
           <a:p>
-            <a:pPr marL="342900" indent="-342900">
+            <a:pPr marL="571500" indent="-571500">
               <a:buFont typeface="Arial" charset="0"/>
               <a:buChar char="•"/>
             </a:pPr>
             <a:r>
-              <a:rPr lang="en-US" sz="4000" b="1" dirty="0" smtClean="0">
+              <a:rPr lang="en-US" sz="4000" dirty="0">
                 <a:solidFill>
                   <a:srgbClr val="002060"/>
                 </a:solidFill>
               </a:rPr>
-              <a:t>Number of features: 10 ~ 64</a:t>
-            </a:r>
-            <a:endParaRPr lang="ko-KR" altLang="en-US" sz="4000" b="1" dirty="0" smtClean="0">
-              <a:solidFill>
-                <a:srgbClr val="002060"/>
-              </a:solidFill>
-            </a:endParaRPr>
+              <a:t>Number of features: </a:t>
+            </a:r>
+            <a:r>
+              <a:rPr lang="en-US" sz="4000" dirty="0" smtClean="0">
+                <a:solidFill>
+                  <a:srgbClr val="002060"/>
+                </a:solidFill>
+              </a:rPr>
+              <a:t>18 (include 1 dummy)</a:t>
+            </a:r>
           </a:p>
           <a:p>
-            <a:pPr marL="342900" indent="-342900">
+            <a:pPr marL="571500" indent="-571500">
               <a:buFont typeface="Arial" charset="0"/>
               <a:buChar char="•"/>
             </a:pPr>
             <a:r>
-              <a:rPr lang="en-US" sz="4000" b="1" dirty="0" smtClean="0">
+              <a:rPr lang="en-US" sz="4000" dirty="0" smtClean="0">
                 <a:solidFill>
                   <a:srgbClr val="002060"/>
                 </a:solidFill>
               </a:rPr>
-              <a:t>Number of iteration: 10 ~ 20</a:t>
-            </a:r>
-            <a:r>
-              <a:rPr lang="ko-KR" altLang="en-US" sz="4000" b="1" dirty="0">
-                <a:solidFill>
-                  <a:srgbClr val="002060"/>
-                </a:solidFill>
-              </a:rPr>
-              <a:t> </a:t>
-            </a:r>
-            <a:r>
-              <a:rPr lang="en-US" sz="4000" b="1" dirty="0" smtClean="0">
-                <a:solidFill>
-                  <a:srgbClr val="002060"/>
-                </a:solidFill>
-              </a:rPr>
-              <a:t>(depend on learning rate)</a:t>
-            </a:r>
-            <a:endParaRPr lang="en-US" sz="4000" b="1" dirty="0" smtClean="0">
-              <a:solidFill>
-                <a:srgbClr val="002060"/>
-              </a:solidFill>
-            </a:endParaRPr>
+              <a:t>Timing result: 300 seconds per iteration,</a:t>
+            </a:r>
           </a:p>
           <a:p>
             <a:pPr marL="342900" indent="-342900">
@@ -17134,9 +17196,9 @@
           <p:nvPr/>
         </p:nvCxnSpPr>
         <p:spPr>
-          <a:xfrm>
-            <a:off x="26748551" y="22826109"/>
-            <a:ext cx="15169" cy="7003588"/>
+          <a:xfrm flipH="1">
+            <a:off x="26763720" y="24304153"/>
+            <a:ext cx="10954" cy="5525544"/>
           </a:xfrm>
           <a:prstGeom prst="line">
             <a:avLst/>
@@ -17177,7 +17239,7 @@
         </p:nvSpPr>
         <p:spPr>
           <a:xfrm>
-            <a:off x="15653865" y="22826109"/>
+            <a:off x="15653865" y="23740512"/>
             <a:ext cx="10353376" cy="1055054"/>
           </a:xfrm>
         </p:spPr>
@@ -17209,10 +17271,10 @@
         </p:nvGrpSpPr>
         <p:grpSpPr>
           <a:xfrm>
-            <a:off x="16517744" y="27171129"/>
-            <a:ext cx="5638800" cy="1714991"/>
-            <a:chOff x="16334520" y="24156557"/>
-            <a:chExt cx="5638800" cy="1714991"/>
+            <a:off x="16543377" y="28085532"/>
+            <a:ext cx="5511800" cy="1062903"/>
+            <a:chOff x="16360153" y="24156557"/>
+            <a:chExt cx="5511800" cy="1062903"/>
           </a:xfrm>
         </p:grpSpPr>
         <p:pic>
@@ -17263,50 +17325,7 @@
             </a:prstGeom>
           </p:spPr>
         </p:pic>
-        <p:pic>
-          <p:nvPicPr>
-            <p:cNvPr id="54" name="Picture 53"/>
-            <p:cNvPicPr>
-              <a:picLocks noChangeAspect="1"/>
-            </p:cNvPicPr>
-            <p:nvPr/>
-          </p:nvPicPr>
-          <p:blipFill>
-            <a:blip r:embed="rId11"/>
-            <a:stretch>
-              <a:fillRect/>
-            </a:stretch>
-          </p:blipFill>
-          <p:spPr>
-            <a:xfrm>
-              <a:off x="16334520" y="25452448"/>
-              <a:ext cx="5638800" cy="419100"/>
-            </a:xfrm>
-            <a:prstGeom prst="rect">
-              <a:avLst/>
-            </a:prstGeom>
-          </p:spPr>
-        </p:pic>
       </p:grpSp>
-      <p:sp>
-        <p:nvSpPr>
-          <p:cNvPr id="55" name="Text Placeholder 54"/>
-          <p:cNvSpPr>
-            <a:spLocks noGrp="1"/>
-          </p:cNvSpPr>
-          <p:nvPr>
-            <p:ph type="body" sz="quarter" idx="96"/>
-          </p:nvPr>
-        </p:nvSpPr>
-        <p:spPr/>
-        <p:txBody>
-          <a:bodyPr/>
-          <a:lstStyle/>
-          <a:p>
-            <a:endParaRPr lang="en-US"/>
-          </a:p>
-        </p:txBody>
-      </p:sp>
       <p:sp>
         <p:nvSpPr>
           <p:cNvPr id="221" name="Text Placeholder 31"/>
@@ -17319,8 +17338,8 @@
         </p:nvSpPr>
         <p:spPr>
           <a:xfrm>
-            <a:off x="16052117" y="23913379"/>
-            <a:ext cx="8799969" cy="3046966"/>
+            <a:off x="16052117" y="24827782"/>
+            <a:ext cx="10291312" cy="3046966"/>
           </a:xfrm>
         </p:spPr>
         <p:txBody>
@@ -17337,8 +17356,21 @@
                   <a:srgbClr val="002060"/>
                 </a:solidFill>
               </a:rPr>
-              <a:t>We used SEAL with RNS-FV version and bootstrapping implementation.</a:t>
-            </a:r>
+              <a:t>We used SEAL with RNS-FV version and bootstrapping </a:t>
+            </a:r>
+            <a:r>
+              <a:rPr lang="en-US" sz="4000" dirty="0" smtClean="0">
+                <a:solidFill>
+                  <a:srgbClr val="002060"/>
+                </a:solidFill>
+              </a:rPr>
+              <a:t>implementation [2].</a:t>
+            </a:r>
+            <a:endParaRPr lang="en-US" sz="4000" dirty="0" smtClean="0">
+              <a:solidFill>
+                <a:srgbClr val="002060"/>
+              </a:solidFill>
+            </a:endParaRPr>
           </a:p>
           <a:p>
             <a:pPr marL="342900" indent="-342900">
@@ -17351,27 +17383,146 @@
                   <a:srgbClr val="002060"/>
                 </a:solidFill>
               </a:rPr>
-              <a:t>Each coeff</a:t>
-            </a:r>
-            <a:r>
-              <a:rPr lang="en-US" sz="4000" dirty="0" smtClean="0">
-                <a:solidFill>
-                  <a:srgbClr val="002060"/>
-                </a:solidFill>
-              </a:rPr>
-              <a:t>icient </a:t>
-            </a:r>
-            <a:r>
-              <a:rPr lang="en-US" sz="4000" dirty="0" smtClean="0">
-                <a:solidFill>
-                  <a:srgbClr val="002060"/>
-                </a:solidFill>
-              </a:rPr>
-              <a:t>modulus chain is 60-bit prime integer</a:t>
+              <a:t>Each coefficient modulus chain is 60-bit prime integer</a:t>
             </a:r>
           </a:p>
         </p:txBody>
       </p:sp>
+      <p:pic>
+        <p:nvPicPr>
+          <p:cNvPr id="6" name="Picture 5"/>
+          <p:cNvPicPr>
+            <a:picLocks noChangeAspect="1"/>
+          </p:cNvPicPr>
+          <p:nvPr/>
+        </p:nvPicPr>
+        <p:blipFill>
+          <a:blip r:embed="rId11"/>
+          <a:stretch>
+            <a:fillRect/>
+          </a:stretch>
+        </p:blipFill>
+        <p:spPr>
+          <a:xfrm>
+            <a:off x="16530677" y="29240624"/>
+            <a:ext cx="4495800" cy="508000"/>
+          </a:xfrm>
+          <a:prstGeom prst="rect">
+            <a:avLst/>
+          </a:prstGeom>
+        </p:spPr>
+      </p:pic>
+      <p:grpSp>
+        <p:nvGrpSpPr>
+          <p:cNvPr id="10" name="Group 9"/>
+          <p:cNvGrpSpPr/>
+          <p:nvPr/>
+        </p:nvGrpSpPr>
+        <p:grpSpPr>
+          <a:xfrm>
+            <a:off x="24528634" y="21549974"/>
+            <a:ext cx="9626401" cy="1384300"/>
+            <a:chOff x="17948381" y="21722587"/>
+            <a:chExt cx="9626401" cy="1384300"/>
+          </a:xfrm>
+        </p:grpSpPr>
+        <p:pic>
+          <p:nvPicPr>
+            <p:cNvPr id="2" name="Picture 1"/>
+            <p:cNvPicPr>
+              <a:picLocks noChangeAspect="1"/>
+            </p:cNvPicPr>
+            <p:nvPr/>
+          </p:nvPicPr>
+          <p:blipFill>
+            <a:blip r:embed="rId12"/>
+            <a:stretch>
+              <a:fillRect/>
+            </a:stretch>
+          </p:blipFill>
+          <p:spPr>
+            <a:xfrm>
+              <a:off x="22202682" y="21722587"/>
+              <a:ext cx="5372100" cy="1384300"/>
+            </a:xfrm>
+            <a:prstGeom prst="rect">
+              <a:avLst/>
+            </a:prstGeom>
+          </p:spPr>
+        </p:pic>
+        <p:pic>
+          <p:nvPicPr>
+            <p:cNvPr id="3" name="Picture 2"/>
+            <p:cNvPicPr>
+              <a:picLocks noChangeAspect="1"/>
+            </p:cNvPicPr>
+            <p:nvPr/>
+          </p:nvPicPr>
+          <p:blipFill>
+            <a:blip r:embed="rId13"/>
+            <a:stretch>
+              <a:fillRect/>
+            </a:stretch>
+          </p:blipFill>
+          <p:spPr>
+            <a:xfrm>
+              <a:off x="17948381" y="22071537"/>
+              <a:ext cx="2628900" cy="495300"/>
+            </a:xfrm>
+            <a:prstGeom prst="rect">
+              <a:avLst/>
+            </a:prstGeom>
+          </p:spPr>
+        </p:pic>
+        <p:pic>
+          <p:nvPicPr>
+            <p:cNvPr id="9" name="Picture 8"/>
+            <p:cNvPicPr>
+              <a:picLocks noChangeAspect="1"/>
+            </p:cNvPicPr>
+            <p:nvPr/>
+          </p:nvPicPr>
+          <p:blipFill>
+            <a:blip r:embed="rId14"/>
+            <a:stretch>
+              <a:fillRect/>
+            </a:stretch>
+          </p:blipFill>
+          <p:spPr>
+            <a:xfrm flipV="1">
+              <a:off x="21033012" y="22226802"/>
+              <a:ext cx="619692" cy="375571"/>
+            </a:xfrm>
+            <a:prstGeom prst="rect">
+              <a:avLst/>
+            </a:prstGeom>
+          </p:spPr>
+        </p:pic>
+      </p:grpSp>
+      <p:pic>
+        <p:nvPicPr>
+          <p:cNvPr id="12" name="Picture 11"/>
+          <p:cNvPicPr>
+            <a:picLocks noChangeAspect="1"/>
+          </p:cNvPicPr>
+          <p:nvPr/>
+        </p:nvPicPr>
+        <p:blipFill>
+          <a:blip r:embed="rId15"/>
+          <a:stretch>
+            <a:fillRect/>
+          </a:stretch>
+        </p:blipFill>
+        <p:spPr>
+          <a:xfrm>
+            <a:off x="38336855" y="29373067"/>
+            <a:ext cx="3149600" cy="330200"/>
+          </a:xfrm>
+          <a:prstGeom prst="rect">
+            <a:avLst/>
+          </a:prstGeom>
+        </p:spPr>
+      </p:pic>
     </p:spTree>
     <p:extLst>
       <p:ext uri="{BB962C8B-B14F-4D97-AF65-F5344CB8AC3E}">

</xml_diff>